<commit_message>
completes PowerPoint with current testing numbers
</commit_message>
<xml_diff>
--- a/DesignDocuments/Income Experiences.pptx
+++ b/DesignDocuments/Income Experiences.pptx
@@ -16,8 +16,9 @@
     <p:sldId id="261" r:id="rId10"/>
     <p:sldId id="262" r:id="rId11"/>
     <p:sldId id="268" r:id="rId12"/>
-    <p:sldId id="263" r:id="rId13"/>
-    <p:sldId id="264" r:id="rId14"/>
+    <p:sldId id="269" r:id="rId13"/>
+    <p:sldId id="263" r:id="rId14"/>
+    <p:sldId id="264" r:id="rId15"/>
   </p:sldIdLst>
   <p:sldSz cx="12192000" cy="6858000"/>
   <p:notesSz cx="6858000" cy="9144000"/>
@@ -320,7 +321,7 @@
           <a:p>
             <a:fld id="{A6BC2551-747C-4ACC-9037-2FFC526F258C}" type="datetimeFigureOut">
               <a:rPr lang="en-US" smtClean="0"/>
-              <a:t>5/12/2019</a:t>
+              <a:t>5/13/2019</a:t>
             </a:fld>
             <a:endParaRPr lang="en-US"/>
           </a:p>
@@ -541,7 +542,7 @@
           <a:p>
             <a:fld id="{A6BC2551-747C-4ACC-9037-2FFC526F258C}" type="datetimeFigureOut">
               <a:rPr lang="en-US" smtClean="0"/>
-              <a:t>5/12/2019</a:t>
+              <a:t>5/13/2019</a:t>
             </a:fld>
             <a:endParaRPr lang="en-US"/>
           </a:p>
@@ -721,7 +722,7 @@
           <a:p>
             <a:fld id="{A6BC2551-747C-4ACC-9037-2FFC526F258C}" type="datetimeFigureOut">
               <a:rPr lang="en-US" smtClean="0"/>
-              <a:t>5/12/2019</a:t>
+              <a:t>5/13/2019</a:t>
             </a:fld>
             <a:endParaRPr lang="en-US"/>
           </a:p>
@@ -891,7 +892,7 @@
           <a:p>
             <a:fld id="{A6BC2551-747C-4ACC-9037-2FFC526F258C}" type="datetimeFigureOut">
               <a:rPr lang="en-US" smtClean="0"/>
-              <a:t>5/12/2019</a:t>
+              <a:t>5/13/2019</a:t>
             </a:fld>
             <a:endParaRPr lang="en-US"/>
           </a:p>
@@ -1142,7 +1143,7 @@
           <a:p>
             <a:fld id="{A6BC2551-747C-4ACC-9037-2FFC526F258C}" type="datetimeFigureOut">
               <a:rPr lang="en-US" smtClean="0"/>
-              <a:t>5/12/2019</a:t>
+              <a:t>5/13/2019</a:t>
             </a:fld>
             <a:endParaRPr lang="en-US"/>
           </a:p>
@@ -1465,7 +1466,7 @@
           <a:p>
             <a:fld id="{A6BC2551-747C-4ACC-9037-2FFC526F258C}" type="datetimeFigureOut">
               <a:rPr lang="en-US" smtClean="0"/>
-              <a:t>5/12/2019</a:t>
+              <a:t>5/13/2019</a:t>
             </a:fld>
             <a:endParaRPr lang="en-US"/>
           </a:p>
@@ -1894,7 +1895,7 @@
           <a:p>
             <a:fld id="{A6BC2551-747C-4ACC-9037-2FFC526F258C}" type="datetimeFigureOut">
               <a:rPr lang="en-US" smtClean="0"/>
-              <a:t>5/12/2019</a:t>
+              <a:t>5/13/2019</a:t>
             </a:fld>
             <a:endParaRPr lang="en-US"/>
           </a:p>
@@ -2017,7 +2018,7 @@
           <a:p>
             <a:fld id="{A6BC2551-747C-4ACC-9037-2FFC526F258C}" type="datetimeFigureOut">
               <a:rPr lang="en-US" smtClean="0"/>
-              <a:t>5/12/2019</a:t>
+              <a:t>5/13/2019</a:t>
             </a:fld>
             <a:endParaRPr lang="en-US"/>
           </a:p>
@@ -2112,7 +2113,7 @@
           <a:p>
             <a:fld id="{A6BC2551-747C-4ACC-9037-2FFC526F258C}" type="datetimeFigureOut">
               <a:rPr lang="en-US" smtClean="0"/>
-              <a:t>5/12/2019</a:t>
+              <a:t>5/13/2019</a:t>
             </a:fld>
             <a:endParaRPr lang="en-US"/>
           </a:p>
@@ -2402,7 +2403,7 @@
           <a:p>
             <a:fld id="{A6BC2551-747C-4ACC-9037-2FFC526F258C}" type="datetimeFigureOut">
               <a:rPr lang="en-US" smtClean="0"/>
-              <a:t>5/12/2019</a:t>
+              <a:t>5/13/2019</a:t>
             </a:fld>
             <a:endParaRPr lang="en-US"/>
           </a:p>
@@ -2679,7 +2680,7 @@
           <a:p>
             <a:fld id="{A6BC2551-747C-4ACC-9037-2FFC526F258C}" type="datetimeFigureOut">
               <a:rPr lang="en-US" smtClean="0"/>
-              <a:t>5/12/2019</a:t>
+              <a:t>5/13/2019</a:t>
             </a:fld>
             <a:endParaRPr lang="en-US"/>
           </a:p>
@@ -2933,7 +2934,7 @@
           <a:p>
             <a:fld id="{A6BC2551-747C-4ACC-9037-2FFC526F258C}" type="datetimeFigureOut">
               <a:rPr lang="en-US" smtClean="0"/>
-              <a:t>5/12/2019</a:t>
+              <a:t>5/13/2019</a:t>
             </a:fld>
             <a:endParaRPr lang="en-US"/>
           </a:p>
@@ -3544,13 +3545,27 @@
           <a:p>
             <a:r>
               <a:rPr lang="en-US" dirty="0"/>
-              <a:t>Thorough testing of DAO</a:t>
+              <a:t>Deploy and see if pages talk to each other</a:t>
             </a:r>
           </a:p>
           <a:p>
             <a:r>
               <a:rPr lang="en-US" dirty="0"/>
-              <a:t>Using a unit test as a hack to retrieve </a:t>
+              <a:t>Unit testing</a:t>
+            </a:r>
+          </a:p>
+          <a:p>
+            <a:pPr lvl="1"/>
+            <a:r>
+              <a:rPr lang="en-US" dirty="0"/>
+              <a:t>DAO – thorough, learned to use through testing</a:t>
+            </a:r>
+          </a:p>
+          <a:p>
+            <a:pPr lvl="1"/>
+            <a:r>
+              <a:rPr lang="en-US" dirty="0"/>
+              <a:t>API – initially used unit test to retrieve </a:t>
             </a:r>
             <a:r>
               <a:rPr lang="en-US" dirty="0" err="1"/>
@@ -3562,15 +3577,17 @@
             </a:r>
           </a:p>
           <a:p>
+            <a:pPr lvl="1"/>
             <a:r>
               <a:rPr lang="en-US" dirty="0"/>
-              <a:t>Some degree of testing-while-coding</a:t>
-            </a:r>
-          </a:p>
-          <a:p>
+              <a:t>Some testing-while-coding</a:t>
+            </a:r>
+          </a:p>
+          <a:p>
+            <a:pPr lvl="1"/>
             <a:r>
               <a:rPr lang="en-US" dirty="0"/>
-              <a:t>Some testing viewed as maintenance and saved until the end… and beyond</a:t>
+              <a:t>Some saved until the end… and beyond</a:t>
             </a:r>
           </a:p>
         </p:txBody>
@@ -3633,31 +3650,37 @@
           </a:p>
         </p:txBody>
       </p:sp>
-      <p:sp>
-        <p:nvSpPr>
-          <p:cNvPr id="3" name="Content Placeholder 2">
+      <p:pic>
+        <p:nvPicPr>
+          <p:cNvPr id="4" name="Content Placeholder 3">
             <a:extLst>
               <a:ext uri="{FF2B5EF4-FFF2-40B4-BE49-F238E27FC236}">
-                <a16:creationId xmlns:a16="http://schemas.microsoft.com/office/drawing/2014/main" id="{FE102165-2B4A-4688-B2C1-70497B2FFA72}"/>
+                <a16:creationId xmlns:a16="http://schemas.microsoft.com/office/drawing/2014/main" id="{068C272E-12F6-413D-BDF4-9CEF91D98F64}"/>
               </a:ext>
             </a:extLst>
           </p:cNvPr>
-          <p:cNvSpPr>
-            <a:spLocks noGrp="1"/>
-          </p:cNvSpPr>
+          <p:cNvPicPr>
+            <a:picLocks noGrp="1" noChangeAspect="1"/>
+          </p:cNvPicPr>
           <p:nvPr>
             <p:ph idx="1"/>
           </p:nvPr>
-        </p:nvSpPr>
-        <p:spPr/>
-        <p:txBody>
-          <a:bodyPr/>
-          <a:lstStyle/>
-          <a:p>
-            <a:endParaRPr lang="en-US" dirty="0"/>
-          </a:p>
-        </p:txBody>
-      </p:sp>
+        </p:nvPicPr>
+        <p:blipFill rotWithShape="1">
+          <a:blip r:embed="rId2"/>
+          <a:srcRect r="792"/>
+          <a:stretch/>
+        </p:blipFill>
+        <p:spPr>
+          <a:xfrm>
+            <a:off x="228599" y="2320701"/>
+            <a:ext cx="11715561" cy="3039864"/>
+          </a:xfrm>
+          <a:prstGeom prst="rect">
+            <a:avLst/>
+          </a:prstGeom>
+        </p:spPr>
+      </p:pic>
     </p:spTree>
     <p:extLst>
       <p:ext uri="{BB962C8B-B14F-4D97-AF65-F5344CB8AC3E}">
@@ -3693,7 +3716,7 @@
           <p:cNvPr id="2" name="Title 1">
             <a:extLst>
               <a:ext uri="{FF2B5EF4-FFF2-40B4-BE49-F238E27FC236}">
-                <a16:creationId xmlns:a16="http://schemas.microsoft.com/office/drawing/2014/main" id="{BCE3675C-AA0D-4464-8394-B06CEC6ECC11}"/>
+                <a16:creationId xmlns:a16="http://schemas.microsoft.com/office/drawing/2014/main" id="{1C18DAAD-A0F4-40E9-AECC-667E71A76A21}"/>
               </a:ext>
             </a:extLst>
           </p:cNvPr>
@@ -3704,173 +3727,59 @@
             <p:ph type="title"/>
           </p:nvPr>
         </p:nvSpPr>
-        <p:spPr/>
+        <p:spPr>
+          <a:xfrm>
+            <a:off x="1143000" y="609600"/>
+            <a:ext cx="2430710" cy="1356360"/>
+          </a:xfrm>
+        </p:spPr>
         <p:txBody>
           <a:bodyPr/>
           <a:lstStyle/>
           <a:p>
             <a:r>
               <a:rPr lang="en-US" dirty="0"/>
-              <a:t>Lessons Learned</a:t>
-            </a:r>
-          </a:p>
-        </p:txBody>
-      </p:sp>
-      <p:sp>
-        <p:nvSpPr>
-          <p:cNvPr id="3" name="Content Placeholder 2">
+              <a:t>Testing Coverage</a:t>
+            </a:r>
+          </a:p>
+        </p:txBody>
+      </p:sp>
+      <p:pic>
+        <p:nvPicPr>
+          <p:cNvPr id="4" name="Content Placeholder 3">
             <a:extLst>
               <a:ext uri="{FF2B5EF4-FFF2-40B4-BE49-F238E27FC236}">
-                <a16:creationId xmlns:a16="http://schemas.microsoft.com/office/drawing/2014/main" id="{EF952F3F-F5D7-473D-8271-4CEE87B1104E}"/>
+                <a16:creationId xmlns:a16="http://schemas.microsoft.com/office/drawing/2014/main" id="{412E8876-7471-4AF3-8F0E-B1BD28B73FC3}"/>
               </a:ext>
             </a:extLst>
           </p:cNvPr>
-          <p:cNvSpPr>
-            <a:spLocks noGrp="1"/>
-          </p:cNvSpPr>
+          <p:cNvPicPr>
+            <a:picLocks noGrp="1" noChangeAspect="1"/>
+          </p:cNvPicPr>
           <p:nvPr>
             <p:ph idx="1"/>
           </p:nvPr>
-        </p:nvSpPr>
+        </p:nvPicPr>
+        <p:blipFill>
+          <a:blip r:embed="rId2"/>
+          <a:stretch>
+            <a:fillRect/>
+          </a:stretch>
+        </p:blipFill>
         <p:spPr>
           <a:xfrm>
-            <a:off x="1143000" y="2057400"/>
-            <a:ext cx="7820025" cy="4038600"/>
+            <a:off x="5212939" y="238037"/>
+            <a:ext cx="4594119" cy="6381926"/>
           </a:xfrm>
+          <a:prstGeom prst="rect">
+            <a:avLst/>
+          </a:prstGeom>
         </p:spPr>
-        <p:txBody>
-          <a:bodyPr>
-            <a:normAutofit/>
-          </a:bodyPr>
-          <a:lstStyle/>
-          <a:p>
-            <a:r>
-              <a:rPr lang="en-US" dirty="0"/>
-              <a:t>Love</a:t>
-            </a:r>
-          </a:p>
-          <a:p>
-            <a:pPr lvl="1"/>
-            <a:r>
-              <a:rPr lang="en-US" b="1" dirty="0">
-                <a:solidFill>
-                  <a:schemeClr val="accent6">
-                    <a:lumMod val="75000"/>
-                  </a:schemeClr>
-                </a:solidFill>
-              </a:rPr>
-              <a:t>My charts! </a:t>
-            </a:r>
-            <a:r>
-              <a:rPr lang="en-US" dirty="0">
-                <a:solidFill>
-                  <a:schemeClr val="accent6">
-                    <a:lumMod val="75000"/>
-                  </a:schemeClr>
-                </a:solidFill>
-              </a:rPr>
-              <a:t> </a:t>
-            </a:r>
-            <a:r>
-              <a:rPr lang="en-US" dirty="0"/>
-              <a:t>--  This is my first project integrating Java and JavaScript!</a:t>
-            </a:r>
-          </a:p>
-          <a:p>
-            <a:pPr lvl="1"/>
-            <a:r>
-              <a:rPr lang="en-US" b="1" dirty="0">
-                <a:solidFill>
-                  <a:schemeClr val="accent6">
-                    <a:lumMod val="75000"/>
-                  </a:schemeClr>
-                </a:solidFill>
-              </a:rPr>
-              <a:t>Data! </a:t>
-            </a:r>
-            <a:r>
-              <a:rPr lang="en-US" dirty="0">
-                <a:solidFill>
-                  <a:schemeClr val="accent6">
-                    <a:lumMod val="75000"/>
-                  </a:schemeClr>
-                </a:solidFill>
-              </a:rPr>
-              <a:t>  </a:t>
-            </a:r>
-            <a:r>
-              <a:rPr lang="en-US" dirty="0"/>
-              <a:t>--  I got to know Hibernate well and made good use of it.</a:t>
-            </a:r>
-          </a:p>
-          <a:p>
-            <a:pPr lvl="1"/>
-            <a:endParaRPr lang="en-US" dirty="0"/>
-          </a:p>
-          <a:p>
-            <a:r>
-              <a:rPr lang="en-US" dirty="0"/>
-              <a:t>Change</a:t>
-            </a:r>
-          </a:p>
-          <a:p>
-            <a:pPr lvl="1"/>
-            <a:r>
-              <a:rPr lang="en-US" dirty="0"/>
-              <a:t>Use project Lombok</a:t>
-            </a:r>
-          </a:p>
-          <a:p>
-            <a:pPr lvl="1"/>
-            <a:r>
-              <a:rPr lang="en-US" b="1" dirty="0">
-                <a:solidFill>
-                  <a:schemeClr val="accent6">
-                    <a:lumMod val="75000"/>
-                  </a:schemeClr>
-                </a:solidFill>
-              </a:rPr>
-              <a:t>BRUTAL MINIMALISM for MVP scope</a:t>
-            </a:r>
-            <a:r>
-              <a:rPr lang="en-US" dirty="0"/>
-              <a:t>, leaving more time for…</a:t>
-            </a:r>
-          </a:p>
-          <a:p>
-            <a:pPr lvl="2"/>
-            <a:r>
-              <a:rPr lang="en-US" dirty="0"/>
-              <a:t>Using a superclass for similar classes to avoid repeated code</a:t>
-            </a:r>
-          </a:p>
-          <a:p>
-            <a:pPr lvl="2"/>
-            <a:r>
-              <a:rPr lang="en-US" dirty="0"/>
-              <a:t>More refactoring and unit testing</a:t>
-            </a:r>
-          </a:p>
-          <a:p>
-            <a:pPr lvl="2"/>
-            <a:r>
-              <a:rPr lang="en-US" dirty="0"/>
-              <a:t>Eliminating abandoned code (that I’m currently afraid to delete)</a:t>
-            </a:r>
-          </a:p>
-          <a:p>
-            <a:pPr lvl="1"/>
-            <a:endParaRPr lang="en-US" dirty="0"/>
-          </a:p>
-          <a:p>
-            <a:endParaRPr lang="en-US" dirty="0"/>
-          </a:p>
-        </p:txBody>
-      </p:sp>
+      </p:pic>
     </p:spTree>
     <p:extLst>
       <p:ext uri="{BB962C8B-B14F-4D97-AF65-F5344CB8AC3E}">
-        <p14:creationId xmlns:p14="http://schemas.microsoft.com/office/powerpoint/2010/main" val="750387812"/>
+        <p14:creationId xmlns:p14="http://schemas.microsoft.com/office/powerpoint/2010/main" val="3842089208"/>
       </p:ext>
     </p:extLst>
   </p:cSld>
@@ -3881,6 +3790,223 @@
 </file>
 
 <file path=ppt/slides/slide13.xml><?xml version="1.0" encoding="utf-8"?>
+<p:sld xmlns:a="http://schemas.openxmlformats.org/drawingml/2006/main" xmlns:r="http://schemas.openxmlformats.org/officeDocument/2006/relationships" xmlns:p="http://schemas.openxmlformats.org/presentationml/2006/main">
+  <p:cSld>
+    <p:bg>
+      <p:bgPr>
+        <a:solidFill>
+          <a:schemeClr val="accent1"/>
+        </a:solidFill>
+        <a:effectLst/>
+      </p:bgPr>
+    </p:bg>
+    <p:spTree>
+      <p:nvGrpSpPr>
+        <p:cNvPr id="1" name=""/>
+        <p:cNvGrpSpPr/>
+        <p:nvPr/>
+      </p:nvGrpSpPr>
+      <p:grpSpPr>
+        <a:xfrm>
+          <a:off x="0" y="0"/>
+          <a:ext cx="0" cy="0"/>
+          <a:chOff x="0" y="0"/>
+          <a:chExt cx="0" cy="0"/>
+        </a:xfrm>
+      </p:grpSpPr>
+      <p:sp>
+        <p:nvSpPr>
+          <p:cNvPr id="2" name="Title 1">
+            <a:extLst>
+              <a:ext uri="{FF2B5EF4-FFF2-40B4-BE49-F238E27FC236}">
+                <a16:creationId xmlns:a16="http://schemas.microsoft.com/office/drawing/2014/main" id="{BCE3675C-AA0D-4464-8394-B06CEC6ECC11}"/>
+              </a:ext>
+            </a:extLst>
+          </p:cNvPr>
+          <p:cNvSpPr>
+            <a:spLocks noGrp="1"/>
+          </p:cNvSpPr>
+          <p:nvPr>
+            <p:ph type="title"/>
+          </p:nvPr>
+        </p:nvSpPr>
+        <p:spPr/>
+        <p:txBody>
+          <a:bodyPr/>
+          <a:lstStyle/>
+          <a:p>
+            <a:r>
+              <a:rPr lang="en-US" dirty="0"/>
+              <a:t>Lessons Learned</a:t>
+            </a:r>
+          </a:p>
+        </p:txBody>
+      </p:sp>
+      <p:sp>
+        <p:nvSpPr>
+          <p:cNvPr id="3" name="Content Placeholder 2">
+            <a:extLst>
+              <a:ext uri="{FF2B5EF4-FFF2-40B4-BE49-F238E27FC236}">
+                <a16:creationId xmlns:a16="http://schemas.microsoft.com/office/drawing/2014/main" id="{EF952F3F-F5D7-473D-8271-4CEE87B1104E}"/>
+              </a:ext>
+            </a:extLst>
+          </p:cNvPr>
+          <p:cNvSpPr>
+            <a:spLocks noGrp="1"/>
+          </p:cNvSpPr>
+          <p:nvPr>
+            <p:ph idx="1"/>
+          </p:nvPr>
+        </p:nvSpPr>
+        <p:spPr>
+          <a:xfrm>
+            <a:off x="1143000" y="2057400"/>
+            <a:ext cx="7820025" cy="4038600"/>
+          </a:xfrm>
+        </p:spPr>
+        <p:txBody>
+          <a:bodyPr>
+            <a:normAutofit/>
+          </a:bodyPr>
+          <a:lstStyle/>
+          <a:p>
+            <a:r>
+              <a:rPr lang="en-US" dirty="0"/>
+              <a:t>Love</a:t>
+            </a:r>
+          </a:p>
+          <a:p>
+            <a:pPr lvl="1"/>
+            <a:r>
+              <a:rPr lang="en-US" b="1" dirty="0">
+                <a:solidFill>
+                  <a:schemeClr val="accent6">
+                    <a:lumMod val="75000"/>
+                  </a:schemeClr>
+                </a:solidFill>
+              </a:rPr>
+              <a:t>My charts! </a:t>
+            </a:r>
+            <a:r>
+              <a:rPr lang="en-US" dirty="0">
+                <a:solidFill>
+                  <a:schemeClr val="accent6">
+                    <a:lumMod val="75000"/>
+                  </a:schemeClr>
+                </a:solidFill>
+              </a:rPr>
+              <a:t> </a:t>
+            </a:r>
+            <a:r>
+              <a:rPr lang="en-US" dirty="0"/>
+              <a:t>--  This is my first project integrating Java and JavaScript!</a:t>
+            </a:r>
+          </a:p>
+          <a:p>
+            <a:pPr lvl="1"/>
+            <a:r>
+              <a:rPr lang="en-US" b="1" dirty="0">
+                <a:solidFill>
+                  <a:schemeClr val="accent6">
+                    <a:lumMod val="75000"/>
+                  </a:schemeClr>
+                </a:solidFill>
+              </a:rPr>
+              <a:t>Data! </a:t>
+            </a:r>
+            <a:r>
+              <a:rPr lang="en-US" dirty="0">
+                <a:solidFill>
+                  <a:schemeClr val="accent6">
+                    <a:lumMod val="75000"/>
+                  </a:schemeClr>
+                </a:solidFill>
+              </a:rPr>
+              <a:t>  </a:t>
+            </a:r>
+            <a:r>
+              <a:rPr lang="en-US" dirty="0"/>
+              <a:t>--  I got to know Hibernate well and made good use of it.</a:t>
+            </a:r>
+          </a:p>
+          <a:p>
+            <a:pPr lvl="1"/>
+            <a:endParaRPr lang="en-US" dirty="0"/>
+          </a:p>
+          <a:p>
+            <a:r>
+              <a:rPr lang="en-US" dirty="0"/>
+              <a:t>Change</a:t>
+            </a:r>
+          </a:p>
+          <a:p>
+            <a:pPr lvl="1"/>
+            <a:r>
+              <a:rPr lang="en-US" dirty="0"/>
+              <a:t>Use project Lombok</a:t>
+            </a:r>
+          </a:p>
+          <a:p>
+            <a:pPr lvl="1"/>
+            <a:r>
+              <a:rPr lang="en-US" b="1" dirty="0">
+                <a:solidFill>
+                  <a:schemeClr val="accent6">
+                    <a:lumMod val="75000"/>
+                  </a:schemeClr>
+                </a:solidFill>
+              </a:rPr>
+              <a:t>BRUTAL MINIMALISM for MVP scope</a:t>
+            </a:r>
+            <a:r>
+              <a:rPr lang="en-US" dirty="0"/>
+              <a:t>, leaving more time for…</a:t>
+            </a:r>
+          </a:p>
+          <a:p>
+            <a:pPr lvl="2"/>
+            <a:r>
+              <a:rPr lang="en-US" dirty="0"/>
+              <a:t>Using a superclass for similar classes to avoid repeated code</a:t>
+            </a:r>
+          </a:p>
+          <a:p>
+            <a:pPr lvl="2"/>
+            <a:r>
+              <a:rPr lang="en-US" dirty="0"/>
+              <a:t>More refactoring and unit testing</a:t>
+            </a:r>
+          </a:p>
+          <a:p>
+            <a:pPr lvl="2"/>
+            <a:r>
+              <a:rPr lang="en-US" dirty="0"/>
+              <a:t>Eliminating abandoned code (that I’m currently afraid to delete)</a:t>
+            </a:r>
+          </a:p>
+          <a:p>
+            <a:pPr lvl="1"/>
+            <a:endParaRPr lang="en-US" dirty="0"/>
+          </a:p>
+          <a:p>
+            <a:endParaRPr lang="en-US" dirty="0"/>
+          </a:p>
+        </p:txBody>
+      </p:sp>
+    </p:spTree>
+    <p:extLst>
+      <p:ext uri="{BB962C8B-B14F-4D97-AF65-F5344CB8AC3E}">
+        <p14:creationId xmlns:p14="http://schemas.microsoft.com/office/powerpoint/2010/main" val="750387812"/>
+      </p:ext>
+    </p:extLst>
+  </p:cSld>
+  <p:clrMapOvr>
+    <a:overrideClrMapping bg1="lt1" tx1="dk1" bg2="lt2" tx2="dk2" accent1="accent1" accent2="accent2" accent3="accent3" accent4="accent4" accent5="accent5" accent6="accent6" hlink="hlink" folHlink="folHlink"/>
+  </p:clrMapOvr>
+</p:sld>
+</file>
+
+<file path=ppt/slides/slide14.xml><?xml version="1.0" encoding="utf-8"?>
 <p:sld xmlns:a="http://schemas.openxmlformats.org/drawingml/2006/main" xmlns:r="http://schemas.openxmlformats.org/officeDocument/2006/relationships" xmlns:p="http://schemas.openxmlformats.org/presentationml/2006/main">
   <p:cSld>
     <p:spTree>
@@ -3960,13 +4086,8 @@
           <a:p>
             <a:r>
               <a:rPr lang="en-US" dirty="0"/>
-              <a:t>Let users do a fuzzy search </a:t>
-            </a:r>
-            <a:r>
-              <a:rPr lang="en-US"/>
-              <a:t>for stories</a:t>
-            </a:r>
-            <a:endParaRPr lang="en-US" dirty="0"/>
+              <a:t>Let users do a fuzzy search for stories</a:t>
+            </a:r>
           </a:p>
           <a:p>
             <a:r>
@@ -4031,7 +4152,7 @@
           <a:p>
             <a:r>
               <a:rPr lang="en-US" dirty="0"/>
-              <a:t>Purpose</a:t>
+              <a:t>Links!</a:t>
             </a:r>
           </a:p>
         </p:txBody>
@@ -4054,8 +4175,8 @@
         </p:nvSpPr>
         <p:spPr>
           <a:xfrm>
-            <a:off x="838200" y="2315361"/>
-            <a:ext cx="10515600" cy="3861602"/>
+            <a:off x="838200" y="1895912"/>
+            <a:ext cx="10515600" cy="4281051"/>
           </a:xfrm>
         </p:spPr>
         <p:txBody>
@@ -4064,14 +4185,109 @@
           <a:p>
             <a:r>
               <a:rPr lang="en-US" dirty="0"/>
-              <a:t>The purpose of the site is to help people share and explore what the lived experience of a certain income is, dependent on household size.</a:t>
-            </a:r>
+              <a:t>Website link</a:t>
+            </a:r>
+          </a:p>
+          <a:p>
+            <a:pPr lvl="1"/>
+            <a:r>
+              <a:rPr lang="en-US" dirty="0">
+                <a:hlinkClick r:id="rId2"/>
+              </a:rPr>
+              <a:t>Income Experiences</a:t>
+            </a:r>
+            <a:endParaRPr lang="en-US" dirty="0"/>
           </a:p>
           <a:p>
             <a:r>
               <a:rPr lang="en-US" dirty="0"/>
-              <a:t>Demo link: </a:t>
-            </a:r>
+              <a:t>Demo link – purpose and function: </a:t>
+            </a:r>
+          </a:p>
+          <a:p>
+            <a:pPr lvl="1"/>
+            <a:r>
+              <a:rPr lang="en-US" dirty="0">
+                <a:hlinkClick r:id="rId3"/>
+              </a:rPr>
+              <a:t>Income Experiences Demo on YouTube</a:t>
+            </a:r>
+            <a:r>
+              <a:rPr lang="en-US" dirty="0"/>
+              <a:t>	</a:t>
+            </a:r>
+            <a:r>
+              <a:rPr lang="en-US" sz="1800" dirty="0">
+                <a:solidFill>
+                  <a:schemeClr val="accent5">
+                    <a:lumMod val="50000"/>
+                  </a:schemeClr>
+                </a:solidFill>
+              </a:rPr>
+              <a:t>(8 min)</a:t>
+            </a:r>
+            <a:endParaRPr lang="en-US" sz="1800" dirty="0"/>
+          </a:p>
+          <a:p>
+            <a:pPr lvl="1"/>
+            <a:r>
+              <a:rPr lang="en-US" dirty="0"/>
+              <a:t>(Demo shows how to do CRUD and proves CRU… I promise D works too!)</a:t>
+            </a:r>
+          </a:p>
+          <a:p>
+            <a:r>
+              <a:rPr lang="en-US" dirty="0"/>
+              <a:t>Special topics:</a:t>
+            </a:r>
+          </a:p>
+          <a:p>
+            <a:pPr lvl="1"/>
+            <a:r>
+              <a:rPr lang="en-US" dirty="0">
+                <a:hlinkClick r:id="rId4"/>
+              </a:rPr>
+              <a:t>Hibernate Search (with Filter) Code on YouTube</a:t>
+            </a:r>
+            <a:r>
+              <a:rPr lang="en-US" dirty="0"/>
+              <a:t>	</a:t>
+            </a:r>
+            <a:r>
+              <a:rPr lang="en-US" sz="1800" dirty="0">
+                <a:solidFill>
+                  <a:schemeClr val="accent5">
+                    <a:lumMod val="50000"/>
+                  </a:schemeClr>
+                </a:solidFill>
+              </a:rPr>
+              <a:t>(3 min)</a:t>
+            </a:r>
+            <a:endParaRPr lang="en-US" sz="1800" dirty="0"/>
+          </a:p>
+          <a:p>
+            <a:pPr lvl="1"/>
+            <a:r>
+              <a:rPr lang="en-US" dirty="0">
+                <a:hlinkClick r:id="rId5"/>
+              </a:rPr>
+              <a:t>Chart.js Code on YouTube</a:t>
+            </a:r>
+            <a:r>
+              <a:rPr lang="en-US" dirty="0"/>
+              <a:t> </a:t>
+            </a:r>
+            <a:r>
+              <a:rPr lang="en-US" sz="1800" dirty="0">
+                <a:solidFill>
+                  <a:schemeClr val="accent5">
+                    <a:lumMod val="50000"/>
+                  </a:schemeClr>
+                </a:solidFill>
+              </a:rPr>
+              <a:t>(3 min)</a:t>
+            </a:r>
+            <a:endParaRPr lang="en-US" sz="1800" dirty="0"/>
           </a:p>
         </p:txBody>
       </p:sp>
@@ -4649,7 +4865,7 @@
           <a:p>
             <a:r>
               <a:rPr lang="en-US" dirty="0"/>
-              <a:t>Recent logging of application</a:t>
+              <a:t>Recent Logging of Application</a:t>
             </a:r>
           </a:p>
         </p:txBody>
@@ -4868,6 +5084,33 @@
           <a:p>
             <a:r>
               <a:rPr lang="en-US" dirty="0"/>
+              <a:t>How: </a:t>
+            </a:r>
+            <a:r>
+              <a:rPr lang="en-US" dirty="0">
+                <a:hlinkClick r:id="rId2"/>
+              </a:rPr>
+              <a:t>Hibernate Search Video</a:t>
+            </a:r>
+            <a:r>
+              <a:rPr lang="en-US" dirty="0"/>
+              <a:t>	</a:t>
+            </a:r>
+            <a:r>
+              <a:rPr lang="en-US" sz="2000" dirty="0">
+                <a:solidFill>
+                  <a:schemeClr val="accent5">
+                    <a:lumMod val="50000"/>
+                  </a:schemeClr>
+                </a:solidFill>
+              </a:rPr>
+              <a:t>(3 min)</a:t>
+            </a:r>
+            <a:endParaRPr lang="en-US" dirty="0"/>
+          </a:p>
+          <a:p>
+            <a:r>
+              <a:rPr lang="en-US" dirty="0"/>
               <a:t>References for Independent Research:</a:t>
             </a:r>
           </a:p>
@@ -4889,8 +5132,8 @@
         </p:nvSpPr>
         <p:spPr>
           <a:xfrm>
-            <a:off x="1482716" y="3149109"/>
-            <a:ext cx="9790771" cy="2625754"/>
+            <a:off x="1482716" y="3338818"/>
+            <a:ext cx="9790771" cy="2436045"/>
           </a:xfrm>
           <a:prstGeom prst="rect">
             <a:avLst/>
@@ -5066,23 +5309,23 @@
           </a:lstStyle>
           <a:p>
             <a:r>
-              <a:rPr lang="en-US" dirty="0"/>
+              <a:rPr lang="en-US" sz="2400" dirty="0"/>
               <a:t>Hibernate Search Reference Guide </a:t>
             </a:r>
             <a:r>
-              <a:rPr lang="en-US" dirty="0">
-                <a:hlinkClick r:id="rId2"/>
+              <a:rPr lang="en-US" sz="2400" dirty="0">
+                <a:hlinkClick r:id="rId3"/>
               </a:rPr>
               <a:t>https://docs.jboss.org/hibernate/search/5.9/reference/en-US/pdf/hibernate_search_reference.pdf</a:t>
             </a:r>
-            <a:endParaRPr lang="en-US" dirty="0"/>
+            <a:endParaRPr lang="en-US" sz="2400" dirty="0"/>
           </a:p>
           <a:p>
             <a:pPr marL="0" indent="0">
               <a:buFont typeface="Arial" panose="020B0604020202020204" pitchFamily="34" charset="0"/>
               <a:buNone/>
             </a:pPr>
-            <a:endParaRPr lang="en-US" dirty="0">
+            <a:endParaRPr lang="en-US" sz="2400" dirty="0">
               <a:ln w="0"/>
               <a:effectLst>
                 <a:outerShdw blurRad="38100" dist="19050" dir="2700000" algn="tl" rotWithShape="0">
@@ -5104,24 +5347,24 @@
               <a:defRPr/>
             </a:pPr>
             <a:r>
-              <a:rPr lang="en-US" dirty="0"/>
+              <a:rPr lang="en-US" sz="2400" dirty="0"/>
               <a:t>Hardy </a:t>
             </a:r>
             <a:r>
-              <a:rPr lang="en-US" dirty="0" err="1"/>
+              <a:rPr lang="en-US" sz="2400" dirty="0" err="1"/>
               <a:t>Ferentschik</a:t>
             </a:r>
             <a:r>
-              <a:rPr lang="en-US" dirty="0"/>
+              <a:rPr lang="en-US" sz="2400" dirty="0"/>
               <a:t> “Hibernate Search talk” </a:t>
             </a:r>
             <a:r>
-              <a:rPr lang="en-US" dirty="0">
-                <a:hlinkClick r:id="rId3"/>
+              <a:rPr lang="en-US" sz="2400" dirty="0">
+                <a:hlinkClick r:id="rId4"/>
               </a:rPr>
               <a:t>https://www.youtube.com/watch?v=qPLY9PYv_8g</a:t>
             </a:r>
-            <a:endParaRPr lang="en-US" dirty="0">
+            <a:endParaRPr lang="en-US" sz="2400" dirty="0">
               <a:ln w="0"/>
               <a:effectLst>
                 <a:outerShdw blurRad="38100" dist="19050" dir="2700000" algn="tl" rotWithShape="0">
@@ -5268,6 +5511,33 @@
           <a:p>
             <a:r>
               <a:rPr lang="en-US" dirty="0"/>
+              <a:t>How: </a:t>
+            </a:r>
+            <a:r>
+              <a:rPr lang="en-US" dirty="0">
+                <a:hlinkClick r:id="rId2"/>
+              </a:rPr>
+              <a:t>Chart.js Video</a:t>
+            </a:r>
+            <a:r>
+              <a:rPr lang="en-US" dirty="0"/>
+              <a:t> </a:t>
+            </a:r>
+            <a:r>
+              <a:rPr lang="en-US" sz="2000" dirty="0">
+                <a:solidFill>
+                  <a:schemeClr val="accent5">
+                    <a:lumMod val="50000"/>
+                  </a:schemeClr>
+                </a:solidFill>
+              </a:rPr>
+              <a:t>(3 min)</a:t>
+            </a:r>
+            <a:endParaRPr lang="en-US" sz="2000" dirty="0"/>
+          </a:p>
+          <a:p>
+            <a:r>
+              <a:rPr lang="en-US" dirty="0"/>
               <a:t>References for Independent Research:</a:t>
             </a:r>
           </a:p>
@@ -5293,8 +5563,8 @@
         </p:nvSpPr>
         <p:spPr>
           <a:xfrm>
-            <a:off x="1924050" y="3249946"/>
-            <a:ext cx="8567854" cy="2421145"/>
+            <a:off x="1924050" y="3624044"/>
+            <a:ext cx="8567854" cy="2290195"/>
           </a:xfrm>
           <a:prstGeom prst="rect">
             <a:avLst/>
@@ -5470,23 +5740,23 @@
           </a:lstStyle>
           <a:p>
             <a:r>
-              <a:rPr lang="en-US" dirty="0"/>
+              <a:rPr lang="en-US" sz="2400" dirty="0"/>
               <a:t>Chart.js website </a:t>
             </a:r>
             <a:r>
-              <a:rPr lang="en-US" dirty="0">
-                <a:hlinkClick r:id="rId2"/>
+              <a:rPr lang="en-US" sz="2400" dirty="0">
+                <a:hlinkClick r:id="rId3"/>
               </a:rPr>
               <a:t>https://www.chartjs.org/</a:t>
             </a:r>
-            <a:endParaRPr lang="en-US" dirty="0"/>
+            <a:endParaRPr lang="en-US" sz="2400" dirty="0"/>
           </a:p>
           <a:p>
             <a:pPr marL="0" indent="0">
               <a:buFont typeface="Arial" panose="020B0604020202020204" pitchFamily="34" charset="0"/>
               <a:buNone/>
             </a:pPr>
-            <a:endParaRPr lang="en-US" dirty="0">
+            <a:endParaRPr lang="en-US" sz="2400" dirty="0">
               <a:ln w="0"/>
               <a:effectLst>
                 <a:outerShdw blurRad="38100" dist="19050" dir="2700000" algn="tl" rotWithShape="0">
@@ -5508,74 +5778,23 @@
               <a:defRPr/>
             </a:pPr>
             <a:r>
-              <a:rPr lang="en-US" dirty="0"/>
+              <a:rPr lang="en-US" sz="2400" dirty="0"/>
               <a:t>Post by Joseph </a:t>
             </a:r>
             <a:r>
-              <a:rPr lang="en-US" dirty="0" err="1"/>
+              <a:rPr lang="en-US" sz="2400" dirty="0" err="1"/>
               <a:t>Kulandai</a:t>
             </a:r>
             <a:r>
-              <a:rPr lang="en-US" dirty="0"/>
+              <a:rPr lang="en-US" sz="2400" dirty="0"/>
               <a:t> on using Chart.js with Java </a:t>
             </a:r>
             <a:r>
-              <a:rPr lang="en-US" dirty="0">
-                <a:hlinkClick r:id="rId3"/>
+              <a:rPr lang="en-US" sz="2400" dirty="0">
+                <a:hlinkClick r:id="rId4"/>
               </a:rPr>
               <a:t>https://javapapers.com/ajax/getting-started-with-ajax-using-java/</a:t>
             </a:r>
-            <a:endParaRPr lang="en-US" dirty="0">
-              <a:ln w="0"/>
-              <a:effectLst>
-                <a:outerShdw blurRad="38100" dist="19050" dir="2700000" algn="tl" rotWithShape="0">
-                  <a:schemeClr val="dk1">
-                    <a:alpha val="40000"/>
-                  </a:schemeClr>
-                </a:outerShdw>
-              </a:effectLst>
-              <a:hlinkClick r:id="" action="ppaction://noaction">
-                <a:extLst>
-                  <a:ext uri="{A12FA001-AC4F-418D-AE19-62706E023703}">
-                    <ahyp:hlinkClr xmlns:ahyp="http://schemas.microsoft.com/office/drawing/2018/hyperlinkcolor" val="tx"/>
-                  </a:ext>
-                </a:extLst>
-              </a:hlinkClick>
-            </a:endParaRPr>
-          </a:p>
-          <a:p>
-            <a:endParaRPr lang="en-US" dirty="0">
-              <a:ln w="0"/>
-              <a:effectLst>
-                <a:outerShdw blurRad="38100" dist="19050" dir="2700000" algn="tl" rotWithShape="0">
-                  <a:schemeClr val="dk1">
-                    <a:alpha val="40000"/>
-                  </a:schemeClr>
-                </a:outerShdw>
-              </a:effectLst>
-              <a:hlinkClick r:id="" action="ppaction://noaction">
-                <a:extLst>
-                  <a:ext uri="{A12FA001-AC4F-418D-AE19-62706E023703}">
-                    <ahyp:hlinkClr xmlns:ahyp="http://schemas.microsoft.com/office/drawing/2018/hyperlinkcolor" val="tx"/>
-                  </a:ext>
-                </a:extLst>
-              </a:hlinkClick>
-            </a:endParaRPr>
-          </a:p>
-          <a:p>
-            <a:pPr marL="0" indent="0">
-              <a:buNone/>
-            </a:pPr>
-            <a:endParaRPr lang="en-US" dirty="0"/>
-          </a:p>
-          <a:p>
-            <a:pPr marL="0" indent="0">
-              <a:buFont typeface="Arial" panose="020B0604020202020204" pitchFamily="34" charset="0"/>
-              <a:buNone/>
-            </a:pPr>
-            <a:endParaRPr lang="en-US" dirty="0"/>
-          </a:p>
-          <a:p>
             <a:endParaRPr lang="en-US" dirty="0"/>
           </a:p>
         </p:txBody>
@@ -5988,4 +6207,47 @@
     </a:ext>
   </a:extLst>
 </a:theme>
+</file>
+
+<file path=ppt/theme/themeOverride1.xml><?xml version="1.0" encoding="utf-8"?>
+<a:themeOverride xmlns:a="http://schemas.openxmlformats.org/drawingml/2006/main">
+  <a:clrScheme name="Blue Green">
+    <a:dk1>
+      <a:sysClr val="windowText" lastClr="000000"/>
+    </a:dk1>
+    <a:lt1>
+      <a:sysClr val="window" lastClr="FFFFFF"/>
+    </a:lt1>
+    <a:dk2>
+      <a:srgbClr val="373545"/>
+    </a:dk2>
+    <a:lt2>
+      <a:srgbClr val="CEDBE6"/>
+    </a:lt2>
+    <a:accent1>
+      <a:srgbClr val="3494BA"/>
+    </a:accent1>
+    <a:accent2>
+      <a:srgbClr val="58B6C0"/>
+    </a:accent2>
+    <a:accent3>
+      <a:srgbClr val="75BDA7"/>
+    </a:accent3>
+    <a:accent4>
+      <a:srgbClr val="7A8C8E"/>
+    </a:accent4>
+    <a:accent5>
+      <a:srgbClr val="84ACB6"/>
+    </a:accent5>
+    <a:accent6>
+      <a:srgbClr val="2683C6"/>
+    </a:accent6>
+    <a:hlink>
+      <a:srgbClr val="6B9F25"/>
+    </a:hlink>
+    <a:folHlink>
+      <a:srgbClr val="9F6715"/>
+    </a:folHlink>
+  </a:clrScheme>
+</a:themeOverride>
 </file>
</xml_diff>

<commit_message>
adds tests for SignUpAttempt and updates slidesho
</commit_message>
<xml_diff>
--- a/DesignDocuments/Income Experiences.pptx
+++ b/DesignDocuments/Income Experiences.pptx
@@ -3645,36 +3645,60 @@
           <a:p>
             <a:r>
               <a:rPr lang="en-US" dirty="0"/>
-              <a:t>Testing Coverage</a:t>
-            </a:r>
+              <a:t>Testing Coverage (&gt; 60%)</a:t>
+            </a:r>
+          </a:p>
+        </p:txBody>
+      </p:sp>
+      <p:sp>
+        <p:nvSpPr>
+          <p:cNvPr id="5" name="Content Placeholder 4">
+            <a:extLst>
+              <a:ext uri="{FF2B5EF4-FFF2-40B4-BE49-F238E27FC236}">
+                <a16:creationId xmlns:a16="http://schemas.microsoft.com/office/drawing/2014/main" id="{9142401C-4ABB-4DCE-9E7B-4391FBB68A2D}"/>
+              </a:ext>
+            </a:extLst>
+          </p:cNvPr>
+          <p:cNvSpPr>
+            <a:spLocks noGrp="1"/>
+          </p:cNvSpPr>
+          <p:nvPr>
+            <p:ph idx="1"/>
+          </p:nvPr>
+        </p:nvSpPr>
+        <p:spPr/>
+        <p:txBody>
+          <a:bodyPr/>
+          <a:lstStyle/>
+          <a:p>
+            <a:endParaRPr lang="en-US"/>
           </a:p>
         </p:txBody>
       </p:sp>
       <p:pic>
         <p:nvPicPr>
-          <p:cNvPr id="4" name="Content Placeholder 3">
+          <p:cNvPr id="6" name="Picture 5">
             <a:extLst>
               <a:ext uri="{FF2B5EF4-FFF2-40B4-BE49-F238E27FC236}">
-                <a16:creationId xmlns:a16="http://schemas.microsoft.com/office/drawing/2014/main" id="{068C272E-12F6-413D-BDF4-9CEF91D98F64}"/>
+                <a16:creationId xmlns:a16="http://schemas.microsoft.com/office/drawing/2014/main" id="{16E86117-9491-4677-9F3B-EBA6ECFD4BE0}"/>
               </a:ext>
             </a:extLst>
           </p:cNvPr>
           <p:cNvPicPr>
-            <a:picLocks noGrp="1" noChangeAspect="1"/>
+            <a:picLocks noChangeAspect="1"/>
           </p:cNvPicPr>
-          <p:nvPr>
-            <p:ph idx="1"/>
-          </p:nvPr>
+          <p:nvPr/>
         </p:nvPicPr>
-        <p:blipFill rotWithShape="1">
+        <p:blipFill>
           <a:blip r:embed="rId2"/>
-          <a:srcRect r="792"/>
-          <a:stretch/>
+          <a:stretch>
+            <a:fillRect/>
+          </a:stretch>
         </p:blipFill>
         <p:spPr>
           <a:xfrm>
-            <a:off x="228599" y="2320701"/>
-            <a:ext cx="11715561" cy="3039864"/>
+            <a:off x="222876" y="2057400"/>
+            <a:ext cx="11731436" cy="3814355"/>
           </a:xfrm>
           <a:prstGeom prst="rect">
             <a:avLst/>
@@ -3730,7 +3754,7 @@
         <p:spPr>
           <a:xfrm>
             <a:off x="1143000" y="609600"/>
-            <a:ext cx="2430710" cy="1356360"/>
+            <a:ext cx="2430710" cy="2217490"/>
           </a:xfrm>
         </p:spPr>
         <p:txBody>
@@ -3739,26 +3763,24 @@
           <a:p>
             <a:r>
               <a:rPr lang="en-US" dirty="0"/>
-              <a:t>Testing Coverage</a:t>
+              <a:t>Testing Coverage Details</a:t>
             </a:r>
           </a:p>
         </p:txBody>
       </p:sp>
       <p:pic>
         <p:nvPicPr>
-          <p:cNvPr id="4" name="Content Placeholder 3">
+          <p:cNvPr id="6" name="Picture 5">
             <a:extLst>
               <a:ext uri="{FF2B5EF4-FFF2-40B4-BE49-F238E27FC236}">
-                <a16:creationId xmlns:a16="http://schemas.microsoft.com/office/drawing/2014/main" id="{412E8876-7471-4AF3-8F0E-B1BD28B73FC3}"/>
+                <a16:creationId xmlns:a16="http://schemas.microsoft.com/office/drawing/2014/main" id="{355BB18D-FCBA-4CE5-A489-A19ED7F27A1D}"/>
               </a:ext>
             </a:extLst>
           </p:cNvPr>
           <p:cNvPicPr>
-            <a:picLocks noGrp="1" noChangeAspect="1"/>
+            <a:picLocks noChangeAspect="1"/>
           </p:cNvPicPr>
-          <p:nvPr>
-            <p:ph idx="1"/>
-          </p:nvPr>
+          <p:nvPr/>
         </p:nvPicPr>
         <p:blipFill>
           <a:blip r:embed="rId2"/>
@@ -3768,8 +3790,8 @@
         </p:blipFill>
         <p:spPr>
           <a:xfrm>
-            <a:off x="5212939" y="238037"/>
-            <a:ext cx="4594119" cy="6381926"/>
+            <a:off x="4498203" y="237994"/>
+            <a:ext cx="4478017" cy="6386324"/>
           </a:xfrm>
           <a:prstGeom prst="rect">
             <a:avLst/>

</xml_diff>